<commit_message>
Updated Storyboards - ALL 4
</commit_message>
<xml_diff>
--- a/All StoryBoards with Titles.pptx
+++ b/All StoryBoards with Titles.pptx
@@ -6,8 +6,9 @@
   </p:sldMasterIdLst>
   <p:sldIdLst>
     <p:sldId id="256" r:id="rId2"/>
-    <p:sldId id="257" r:id="rId3"/>
-    <p:sldId id="258" r:id="rId4"/>
+    <p:sldId id="259" r:id="rId3"/>
+    <p:sldId id="257" r:id="rId4"/>
+    <p:sldId id="258" r:id="rId5"/>
   </p:sldIdLst>
   <p:sldSz cx="12192000" cy="6858000"/>
   <p:notesSz cx="6858000" cy="9144000"/>
@@ -106,7 +107,49 @@
       </a:defRPr>
     </a:lvl9pPr>
   </p:defaultTextStyle>
+  <p:extLst>
+    <p:ext uri="{EFAFB233-063F-42B5-8137-9DF3F51BA10A}">
+      <p15:sldGuideLst xmlns:p15="http://schemas.microsoft.com/office/powerpoint/2012/main"/>
+    </p:ext>
+  </p:extLst>
 </p:presentation>
+</file>
+
+<file path=ppt/revisionInfo.xml><?xml version="1.0" encoding="utf-8"?>
+<p1510:revInfo xmlns:a="http://schemas.openxmlformats.org/drawingml/2006/main" xmlns:r="http://schemas.openxmlformats.org/officeDocument/2006/relationships" xmlns:p1510="http://schemas.microsoft.com/office/powerpoint/2015/10/main">
+  <p1510:revLst>
+    <p1510:client id="{2868EEFD-0042-4CF7-98B6-68A1A40B4ADC}" v="2" dt="2024-10-29T22:05:27.894"/>
+  </p1510:revLst>
+</p1510:revInfo>
+</file>
+
+<file path=ppt/changesInfos/changesInfo1.xml><?xml version="1.0" encoding="utf-8"?>
+<pc:chgInfo xmlns:a="http://schemas.openxmlformats.org/drawingml/2006/main" xmlns:r="http://schemas.openxmlformats.org/officeDocument/2006/relationships" xmlns:ac="http://schemas.microsoft.com/office/drawing/2013/main/command" xmlns:pc="http://schemas.microsoft.com/office/powerpoint/2013/main/command">
+  <pc:docChgLst>
+    <pc:chgData name="Tan Karageldi" userId="c7bc117b87e33ed0" providerId="LiveId" clId="{2868EEFD-0042-4CF7-98B6-68A1A40B4ADC}"/>
+    <pc:docChg chg="modSld">
+      <pc:chgData name="Tan Karageldi" userId="c7bc117b87e33ed0" providerId="LiveId" clId="{2868EEFD-0042-4CF7-98B6-68A1A40B4ADC}" dt="2024-10-29T22:05:27.894" v="1"/>
+      <pc:docMkLst>
+        <pc:docMk/>
+      </pc:docMkLst>
+      <pc:sldChg chg="addSp modSp">
+        <pc:chgData name="Tan Karageldi" userId="c7bc117b87e33ed0" providerId="LiveId" clId="{2868EEFD-0042-4CF7-98B6-68A1A40B4ADC}" dt="2024-10-29T22:05:27.894" v="1"/>
+        <pc:sldMkLst>
+          <pc:docMk/>
+          <pc:sldMk cId="1966931229" sldId="256"/>
+        </pc:sldMkLst>
+        <pc:graphicFrameChg chg="add mod">
+          <ac:chgData name="Tan Karageldi" userId="c7bc117b87e33ed0" providerId="LiveId" clId="{2868EEFD-0042-4CF7-98B6-68A1A40B4ADC}" dt="2024-10-29T22:05:27.894" v="1"/>
+          <ac:graphicFrameMkLst>
+            <pc:docMk/>
+            <pc:sldMk cId="1966931229" sldId="256"/>
+            <ac:graphicFrameMk id="3" creationId="{2883A779-4AB2-4D70-AA9A-DA9C168CE3C7}"/>
+          </ac:graphicFrameMkLst>
+        </pc:graphicFrameChg>
+      </pc:sldChg>
+    </pc:docChg>
+  </pc:docChgLst>
+</pc:chgInfo>
 </file>
 
 <file path=ppt/slideLayouts/slideLayout1.xml><?xml version="1.0" encoding="utf-8"?>
@@ -3362,17 +3405,19 @@
         </p:nvSpPr>
         <p:spPr>
           <a:xfrm>
-            <a:off x="1524000" y="0"/>
-            <a:ext cx="9144000" cy="1848897"/>
+            <a:off x="1524000" y="1"/>
+            <a:ext cx="9144000" cy="1671484"/>
           </a:xfrm>
         </p:spPr>
         <p:txBody>
-          <a:bodyPr/>
+          <a:bodyPr>
+            <a:normAutofit fontScale="90000"/>
+          </a:bodyPr>
           <a:lstStyle/>
           <a:p>
             <a:r>
               <a:rPr lang="en-US" dirty="0"/>
-              <a:t>Storyboard – Lesson with MIDI Keyboard</a:t>
+              <a:t>Storyboard – Lesson with App Keyboard</a:t>
             </a:r>
             <a:endParaRPr lang="tr-TR" dirty="0"/>
           </a:p>
@@ -3380,10 +3425,10 @@
       </p:sp>
       <p:pic>
         <p:nvPicPr>
-          <p:cNvPr id="5" name="Picture 4" descr="A screenshot of a music website&#10;&#10;Description automatically generated">
-            <a:extLst>
-              <a:ext uri="{FF2B5EF4-FFF2-40B4-BE49-F238E27FC236}">
-                <a16:creationId xmlns:a16="http://schemas.microsoft.com/office/drawing/2014/main" id="{CA931CD7-C9FA-9C8E-A1D6-989001E39A2B}"/>
+          <p:cNvPr id="4" name="Picture 3" descr="A screenshot of a computer&#10;&#10;Description automatically generated">
+            <a:extLst>
+              <a:ext uri="{FF2B5EF4-FFF2-40B4-BE49-F238E27FC236}">
+                <a16:creationId xmlns:a16="http://schemas.microsoft.com/office/drawing/2014/main" id="{BE5E04A2-CD62-4A30-0F6D-77BB0118258B}"/>
               </a:ext>
             </a:extLst>
           </p:cNvPr>
@@ -3406,8 +3451,8 @@
         </p:blipFill>
         <p:spPr>
           <a:xfrm>
-            <a:off x="1524000" y="1808704"/>
-            <a:ext cx="8795657" cy="4945906"/>
+            <a:off x="1524000" y="1848897"/>
+            <a:ext cx="8701547" cy="4877051"/>
           </a:xfrm>
           <a:prstGeom prst="rect">
             <a:avLst/>
@@ -3449,6 +3494,127 @@
           <p:cNvPr id="4" name="Title 1">
             <a:extLst>
               <a:ext uri="{FF2B5EF4-FFF2-40B4-BE49-F238E27FC236}">
+                <a16:creationId xmlns:a16="http://schemas.microsoft.com/office/drawing/2014/main" id="{490F400E-1D30-E00A-7F4C-B07B8CFD9661}"/>
+              </a:ext>
+            </a:extLst>
+          </p:cNvPr>
+          <p:cNvSpPr txBox="1">
+            <a:spLocks/>
+          </p:cNvSpPr>
+          <p:nvPr/>
+        </p:nvSpPr>
+        <p:spPr>
+          <a:xfrm>
+            <a:off x="1524000" y="0"/>
+            <a:ext cx="9144000" cy="1848897"/>
+          </a:xfrm>
+          <a:prstGeom prst="rect">
+            <a:avLst/>
+          </a:prstGeom>
+        </p:spPr>
+        <p:txBody>
+          <a:bodyPr vert="horz" lIns="91440" tIns="45720" rIns="91440" bIns="45720" rtlCol="0" anchor="ctr">
+            <a:normAutofit/>
+          </a:bodyPr>
+          <a:lstStyle>
+            <a:lvl1pPr algn="l" defTabSz="914400" rtl="0" eaLnBrk="1" latinLnBrk="0" hangingPunct="1">
+              <a:lnSpc>
+                <a:spcPct val="90000"/>
+              </a:lnSpc>
+              <a:spcBef>
+                <a:spcPct val="0"/>
+              </a:spcBef>
+              <a:buNone/>
+              <a:defRPr sz="4400" kern="1200">
+                <a:solidFill>
+                  <a:schemeClr val="tx1"/>
+                </a:solidFill>
+                <a:latin typeface="+mj-lt"/>
+                <a:ea typeface="+mj-ea"/>
+                <a:cs typeface="+mj-cs"/>
+              </a:defRPr>
+            </a:lvl1pPr>
+          </a:lstStyle>
+          <a:p>
+            <a:r>
+              <a:rPr lang="en-US" dirty="0"/>
+              <a:t>Storyboard – Lesson with MIDI Keyboard</a:t>
+            </a:r>
+            <a:endParaRPr lang="tr-TR" dirty="0"/>
+          </a:p>
+        </p:txBody>
+      </p:sp>
+      <p:pic>
+        <p:nvPicPr>
+          <p:cNvPr id="6" name="Picture 5" descr="A screenshot of a computer&#10;&#10;Description automatically generated">
+            <a:extLst>
+              <a:ext uri="{FF2B5EF4-FFF2-40B4-BE49-F238E27FC236}">
+                <a16:creationId xmlns:a16="http://schemas.microsoft.com/office/drawing/2014/main" id="{C74E9383-8472-E39E-C0F4-11135E6D3FAD}"/>
+              </a:ext>
+            </a:extLst>
+          </p:cNvPr>
+          <p:cNvPicPr>
+            <a:picLocks noChangeAspect="1"/>
+          </p:cNvPicPr>
+          <p:nvPr/>
+        </p:nvPicPr>
+        <p:blipFill>
+          <a:blip r:embed="rId2">
+            <a:extLst>
+              <a:ext uri="{28A0092B-C50C-407E-A947-70E740481C1C}">
+                <a14:useLocalDpi xmlns:a14="http://schemas.microsoft.com/office/drawing/2010/main" val="0"/>
+              </a:ext>
+            </a:extLst>
+          </a:blip>
+          <a:stretch>
+            <a:fillRect/>
+          </a:stretch>
+        </p:blipFill>
+        <p:spPr>
+          <a:xfrm>
+            <a:off x="1524000" y="1598819"/>
+            <a:ext cx="8624835" cy="4836900"/>
+          </a:xfrm>
+          <a:prstGeom prst="rect">
+            <a:avLst/>
+          </a:prstGeom>
+        </p:spPr>
+      </p:pic>
+    </p:spTree>
+    <p:extLst>
+      <p:ext uri="{BB962C8B-B14F-4D97-AF65-F5344CB8AC3E}">
+        <p14:creationId xmlns:p14="http://schemas.microsoft.com/office/powerpoint/2010/main" val="3072869744"/>
+      </p:ext>
+    </p:extLst>
+  </p:cSld>
+  <p:clrMapOvr>
+    <a:masterClrMapping/>
+  </p:clrMapOvr>
+</p:sld>
+</file>
+
+<file path=ppt/slides/slide3.xml><?xml version="1.0" encoding="utf-8"?>
+<p:sld xmlns:a="http://schemas.openxmlformats.org/drawingml/2006/main" xmlns:r="http://schemas.openxmlformats.org/officeDocument/2006/relationships" xmlns:p="http://schemas.openxmlformats.org/presentationml/2006/main">
+  <p:cSld>
+    <p:spTree>
+      <p:nvGrpSpPr>
+        <p:cNvPr id="1" name=""/>
+        <p:cNvGrpSpPr/>
+        <p:nvPr/>
+      </p:nvGrpSpPr>
+      <p:grpSpPr>
+        <a:xfrm>
+          <a:off x="0" y="0"/>
+          <a:ext cx="0" cy="0"/>
+          <a:chOff x="0" y="0"/>
+          <a:chExt cx="0" cy="0"/>
+        </a:xfrm>
+      </p:grpSpPr>
+      <p:sp>
+        <p:nvSpPr>
+          <p:cNvPr id="4" name="Title 1">
+            <a:extLst>
+              <a:ext uri="{FF2B5EF4-FFF2-40B4-BE49-F238E27FC236}">
                 <a16:creationId xmlns:a16="http://schemas.microsoft.com/office/drawing/2014/main" id="{2FBCDEEB-A535-03F9-5F1D-EAD21C477B79}"/>
               </a:ext>
             </a:extLst>
@@ -3548,7 +3714,7 @@
 </p:sld>
 </file>
 
-<file path=ppt/slides/slide3.xml><?xml version="1.0" encoding="utf-8"?>
+<file path=ppt/slides/slide4.xml><?xml version="1.0" encoding="utf-8"?>
 <p:sld xmlns:a="http://schemas.openxmlformats.org/drawingml/2006/main" xmlns:r="http://schemas.openxmlformats.org/officeDocument/2006/relationships" xmlns:p="http://schemas.openxmlformats.org/presentationml/2006/main">
   <p:cSld>
     <p:spTree>

</xml_diff>